<commit_message>
edit powerpoints, add HLQ - 2018
</commit_message>
<xml_diff>
--- a/_PowerPoints/1st Semester/Unit 1 Linear Relations/Algebra3_Day_006 1.2 Real Number Intro.pptx
+++ b/_PowerPoints/1st Semester/Unit 1 Linear Relations/Algebra3_Day_006 1.2 Real Number Intro.pptx
@@ -288,7 +288,7 @@
             <a:fld id="{87DE6118-2437-4B30-8E3C-4D2BE6020583}" type="datetimeFigureOut">
               <a:rPr lang="en-US" dirty="0"/>
               <a:pPr/>
-              <a:t>9/5/2017</a:t>
+              <a:t>9/17/2018</a:t>
             </a:fld>
             <a:endParaRPr lang="en-US" dirty="0"/>
           </a:p>
@@ -614,7 +614,7 @@
           <a:p>
             <a:fld id="{87DE6118-2437-4B30-8E3C-4D2BE6020583}" type="datetimeFigureOut">
               <a:rPr lang="en-US" dirty="0"/>
-              <a:t>9/5/2017</a:t>
+              <a:t>9/17/2018</a:t>
             </a:fld>
             <a:endParaRPr lang="en-US" dirty="0"/>
           </a:p>
@@ -789,7 +789,7 @@
           <a:p>
             <a:fld id="{87DE6118-2437-4B30-8E3C-4D2BE6020583}" type="datetimeFigureOut">
               <a:rPr lang="en-US" dirty="0"/>
-              <a:t>9/5/2017</a:t>
+              <a:t>9/17/2018</a:t>
             </a:fld>
             <a:endParaRPr lang="en-US" dirty="0"/>
           </a:p>
@@ -954,7 +954,7 @@
           <a:p>
             <a:fld id="{87DE6118-2437-4B30-8E3C-4D2BE6020583}" type="datetimeFigureOut">
               <a:rPr lang="en-US" dirty="0"/>
-              <a:t>9/5/2017</a:t>
+              <a:t>9/17/2018</a:t>
             </a:fld>
             <a:endParaRPr lang="en-US" dirty="0"/>
           </a:p>
@@ -1227,7 +1227,7 @@
             <a:fld id="{87DE6118-2437-4B30-8E3C-4D2BE6020583}" type="datetimeFigureOut">
               <a:rPr lang="en-US" dirty="0"/>
               <a:pPr/>
-              <a:t>9/5/2017</a:t>
+              <a:t>9/17/2018</a:t>
             </a:fld>
             <a:endParaRPr lang="en-US" dirty="0"/>
           </a:p>
@@ -1617,7 +1617,7 @@
           <a:p>
             <a:fld id="{87DE6118-2437-4B30-8E3C-4D2BE6020583}" type="datetimeFigureOut">
               <a:rPr lang="en-US" dirty="0"/>
-              <a:t>9/5/2017</a:t>
+              <a:t>9/17/2018</a:t>
             </a:fld>
             <a:endParaRPr lang="en-US" dirty="0"/>
           </a:p>
@@ -2089,7 +2089,7 @@
           <a:p>
             <a:fld id="{87DE6118-2437-4B30-8E3C-4D2BE6020583}" type="datetimeFigureOut">
               <a:rPr lang="en-US" dirty="0"/>
-              <a:t>9/5/2017</a:t>
+              <a:t>9/17/2018</a:t>
             </a:fld>
             <a:endParaRPr lang="en-US" dirty="0"/>
           </a:p>
@@ -2202,7 +2202,7 @@
           <a:p>
             <a:fld id="{87DE6118-2437-4B30-8E3C-4D2BE6020583}" type="datetimeFigureOut">
               <a:rPr lang="en-US" dirty="0"/>
-              <a:t>9/5/2017</a:t>
+              <a:t>9/17/2018</a:t>
             </a:fld>
             <a:endParaRPr lang="en-US" dirty="0"/>
           </a:p>
@@ -2292,7 +2292,7 @@
           <a:p>
             <a:fld id="{87DE6118-2437-4B30-8E3C-4D2BE6020583}" type="datetimeFigureOut">
               <a:rPr lang="en-US" dirty="0"/>
-              <a:t>9/5/2017</a:t>
+              <a:t>9/17/2018</a:t>
             </a:fld>
             <a:endParaRPr lang="en-US" dirty="0"/>
           </a:p>
@@ -2634,7 +2634,7 @@
             <a:fld id="{87DE6118-2437-4B30-8E3C-4D2BE6020583}" type="datetimeFigureOut">
               <a:rPr lang="en-US" dirty="0"/>
               <a:pPr/>
-              <a:t>9/5/2017</a:t>
+              <a:t>9/17/2018</a:t>
             </a:fld>
             <a:endParaRPr lang="en-US" dirty="0"/>
           </a:p>
@@ -3019,7 +3019,7 @@
             <a:fld id="{87DE6118-2437-4B30-8E3C-4D2BE6020583}" type="datetimeFigureOut">
               <a:rPr lang="en-US" dirty="0"/>
               <a:pPr/>
-              <a:t>9/5/2017</a:t>
+              <a:t>9/17/2018</a:t>
             </a:fld>
             <a:endParaRPr lang="en-US" dirty="0"/>
           </a:p>
@@ -3294,7 +3294,7 @@
             <a:fld id="{87DE6118-2437-4B30-8E3C-4D2BE6020583}" type="datetimeFigureOut">
               <a:rPr lang="en-US" dirty="0"/>
               <a:pPr/>
-              <a:t>9/5/2017</a:t>
+              <a:t>9/17/2018</a:t>
             </a:fld>
             <a:endParaRPr lang="en-US" dirty="0"/>
           </a:p>
@@ -3833,18 +3833,14 @@
             </a:br>
             <a:r>
               <a:rPr lang="en-US" dirty="0" smtClean="0"/>
-              <a:t>Graph </a:t>
-            </a:r>
-            <a:r>
-              <a:rPr lang="en-US" dirty="0" smtClean="0"/>
-              <a:t>the following: </a:t>
-            </a:r>
-            <a:endParaRPr lang="en-US" dirty="0"/>
-          </a:p>
-        </p:txBody>
-      </p:sp>
-      <mc:AlternateContent xmlns:mc="http://schemas.openxmlformats.org/markup-compatibility/2006">
-        <mc:Choice xmlns:a14="http://schemas.microsoft.com/office/drawing/2010/main" Requires="a14">
+              <a:t>Graph the following: </a:t>
+            </a:r>
+            <a:endParaRPr lang="en-US" dirty="0"/>
+          </a:p>
+        </p:txBody>
+      </p:sp>
+      <mc:AlternateContent xmlns:mc="http://schemas.openxmlformats.org/markup-compatibility/2006" xmlns:a14="http://schemas.microsoft.com/office/drawing/2010/main">
+        <mc:Choice Requires="a14">
           <p:sp>
             <p:nvSpPr>
               <p:cNvPr id="4" name="Rectangle 3"/>
@@ -4120,7 +4116,7 @@
             </p:txBody>
           </p:sp>
         </mc:Choice>
-        <mc:Fallback>
+        <mc:Fallback xmlns="">
           <p:sp>
             <p:nvSpPr>
               <p:cNvPr id="4" name="Rectangle 3"/>
@@ -4159,8 +4155,8 @@
           </p:sp>
         </mc:Fallback>
       </mc:AlternateContent>
-      <mc:AlternateContent xmlns:mc="http://schemas.openxmlformats.org/markup-compatibility/2006">
-        <mc:Choice xmlns:a14="http://schemas.microsoft.com/office/drawing/2010/main" Requires="a14">
+      <mc:AlternateContent xmlns:mc="http://schemas.openxmlformats.org/markup-compatibility/2006" xmlns:a14="http://schemas.microsoft.com/office/drawing/2010/main">
+        <mc:Choice Requires="a14">
           <p:sp>
             <p:nvSpPr>
               <p:cNvPr id="5" name="Rectangle 4"/>
@@ -4417,7 +4413,7 @@
             </p:txBody>
           </p:sp>
         </mc:Choice>
-        <mc:Fallback>
+        <mc:Fallback xmlns="">
           <p:sp>
             <p:nvSpPr>
               <p:cNvPr id="5" name="Rectangle 4"/>
@@ -4456,8 +4452,8 @@
           </p:sp>
         </mc:Fallback>
       </mc:AlternateContent>
-      <mc:AlternateContent xmlns:mc="http://schemas.openxmlformats.org/markup-compatibility/2006">
-        <mc:Choice xmlns:a14="http://schemas.microsoft.com/office/drawing/2010/main" Requires="a14">
+      <mc:AlternateContent xmlns:mc="http://schemas.openxmlformats.org/markup-compatibility/2006" xmlns:a14="http://schemas.microsoft.com/office/drawing/2010/main">
+        <mc:Choice Requires="a14">
           <p:sp>
             <p:nvSpPr>
               <p:cNvPr id="6" name="Rectangle 5"/>
@@ -4518,7 +4514,7 @@
             </p:txBody>
           </p:sp>
         </mc:Choice>
-        <mc:Fallback>
+        <mc:Fallback xmlns="">
           <p:sp>
             <p:nvSpPr>
               <p:cNvPr id="6" name="Rectangle 5"/>

</xml_diff>